<commit_message>
fixed gender counts table
</commit_message>
<xml_diff>
--- a/output/figure_1.pptx
+++ b/output/figure_1.pptx
@@ -2,12 +2,12 @@
 <file path=ppt/presentation.xml><?xml version="1.0" encoding="utf-8"?>
 <p:presentation xmlns:a="http://schemas.openxmlformats.org/drawingml/2006/main" xmlns:r="http://schemas.openxmlformats.org/officeDocument/2006/relationships" xmlns:p="http://schemas.openxmlformats.org/presentationml/2006/main" saveSubsetFonts="1" autoCompressPictures="0">
   <p:sldMasterIdLst>
-    <p:sldMasterId id="2147483660" r:id="rId1"/>
+    <p:sldMasterId id="2147483672" r:id="rId1"/>
   </p:sldMasterIdLst>
   <p:sldIdLst>
     <p:sldId id="256" r:id="rId2"/>
   </p:sldIdLst>
-  <p:sldSz cx="12192000" cy="4572000"/>
+  <p:sldSz cx="14630400" cy="4572000"/>
   <p:notesSz cx="6858000" cy="9144000"/>
   <p:defaultTextStyle>
     <a:defPPr>
@@ -104,6 +104,11 @@
       </a:defRPr>
     </a:lvl9pPr>
   </p:defaultTextStyle>
+  <p:extLst>
+    <p:ext uri="{EFAFB233-063F-42B5-8137-9DF3F51BA10A}">
+      <p15:sldGuideLst xmlns:p15="http://schemas.microsoft.com/office/powerpoint/2012/main"/>
+    </p:ext>
+  </p:extLst>
 </p:presentation>
 </file>
 
@@ -136,8 +141,8 @@
         </p:nvSpPr>
         <p:spPr>
           <a:xfrm>
-            <a:off x="1524000" y="748242"/>
-            <a:ext cx="9144000" cy="1591733"/>
+            <a:off x="1828800" y="748242"/>
+            <a:ext cx="10972800" cy="1591733"/>
           </a:xfrm>
         </p:spPr>
         <p:txBody>
@@ -168,8 +173,8 @@
         </p:nvSpPr>
         <p:spPr>
           <a:xfrm>
-            <a:off x="1524000" y="2401359"/>
-            <a:ext cx="9144000" cy="1103841"/>
+            <a:off x="1828800" y="2401359"/>
+            <a:ext cx="10972800" cy="1103841"/>
           </a:xfrm>
         </p:spPr>
         <p:txBody>
@@ -238,7 +243,7 @@
           <a:p>
             <a:fld id="{764D14E5-F1A5-304C-AFC6-9FE4F2C8391C}" type="datetimeFigureOut">
               <a:rPr lang="en-US" smtClean="0"/>
-              <a:t>12/22/23</a:t>
+              <a:t>12/28/23</a:t>
             </a:fld>
             <a:endParaRPr lang="en-US"/>
           </a:p>
@@ -289,7 +294,7 @@
     </p:spTree>
     <p:extLst>
       <p:ext uri="{BB962C8B-B14F-4D97-AF65-F5344CB8AC3E}">
-        <p14:creationId xmlns:p14="http://schemas.microsoft.com/office/powerpoint/2010/main" val="3567537671"/>
+        <p14:creationId xmlns:p14="http://schemas.microsoft.com/office/powerpoint/2010/main" val="224890863"/>
       </p:ext>
     </p:extLst>
   </p:cSld>
@@ -408,7 +413,7 @@
           <a:p>
             <a:fld id="{764D14E5-F1A5-304C-AFC6-9FE4F2C8391C}" type="datetimeFigureOut">
               <a:rPr lang="en-US" smtClean="0"/>
-              <a:t>12/22/23</a:t>
+              <a:t>12/28/23</a:t>
             </a:fld>
             <a:endParaRPr lang="en-US"/>
           </a:p>
@@ -459,7 +464,7 @@
     </p:spTree>
     <p:extLst>
       <p:ext uri="{BB962C8B-B14F-4D97-AF65-F5344CB8AC3E}">
-        <p14:creationId xmlns:p14="http://schemas.microsoft.com/office/powerpoint/2010/main" val="3881429226"/>
+        <p14:creationId xmlns:p14="http://schemas.microsoft.com/office/powerpoint/2010/main" val="3960312835"/>
       </p:ext>
     </p:extLst>
   </p:cSld>
@@ -498,8 +503,8 @@
         </p:nvSpPr>
         <p:spPr>
           <a:xfrm>
-            <a:off x="8724900" y="243416"/>
-            <a:ext cx="2628900" cy="3874559"/>
+            <a:off x="10469880" y="243416"/>
+            <a:ext cx="3154680" cy="3874559"/>
           </a:xfrm>
         </p:spPr>
         <p:txBody>
@@ -526,8 +531,8 @@
         </p:nvSpPr>
         <p:spPr>
           <a:xfrm>
-            <a:off x="838200" y="243416"/>
-            <a:ext cx="7734300" cy="3874559"/>
+            <a:off x="1005840" y="243416"/>
+            <a:ext cx="9281160" cy="3874559"/>
           </a:xfrm>
         </p:spPr>
         <p:txBody>
@@ -588,7 +593,7 @@
           <a:p>
             <a:fld id="{764D14E5-F1A5-304C-AFC6-9FE4F2C8391C}" type="datetimeFigureOut">
               <a:rPr lang="en-US" smtClean="0"/>
-              <a:t>12/22/23</a:t>
+              <a:t>12/28/23</a:t>
             </a:fld>
             <a:endParaRPr lang="en-US"/>
           </a:p>
@@ -639,7 +644,7 @@
     </p:spTree>
     <p:extLst>
       <p:ext uri="{BB962C8B-B14F-4D97-AF65-F5344CB8AC3E}">
-        <p14:creationId xmlns:p14="http://schemas.microsoft.com/office/powerpoint/2010/main" val="1336386094"/>
+        <p14:creationId xmlns:p14="http://schemas.microsoft.com/office/powerpoint/2010/main" val="778890233"/>
       </p:ext>
     </p:extLst>
   </p:cSld>
@@ -758,7 +763,7 @@
           <a:p>
             <a:fld id="{764D14E5-F1A5-304C-AFC6-9FE4F2C8391C}" type="datetimeFigureOut">
               <a:rPr lang="en-US" smtClean="0"/>
-              <a:t>12/22/23</a:t>
+              <a:t>12/28/23</a:t>
             </a:fld>
             <a:endParaRPr lang="en-US"/>
           </a:p>
@@ -809,7 +814,7 @@
     </p:spTree>
     <p:extLst>
       <p:ext uri="{BB962C8B-B14F-4D97-AF65-F5344CB8AC3E}">
-        <p14:creationId xmlns:p14="http://schemas.microsoft.com/office/powerpoint/2010/main" val="3809868756"/>
+        <p14:creationId xmlns:p14="http://schemas.microsoft.com/office/powerpoint/2010/main" val="2835264200"/>
       </p:ext>
     </p:extLst>
   </p:cSld>
@@ -848,8 +853,8 @@
         </p:nvSpPr>
         <p:spPr>
           <a:xfrm>
-            <a:off x="831850" y="1139826"/>
-            <a:ext cx="10515600" cy="1901825"/>
+            <a:off x="998220" y="1139826"/>
+            <a:ext cx="12618720" cy="1901825"/>
           </a:xfrm>
         </p:spPr>
         <p:txBody>
@@ -880,8 +885,8 @@
         </p:nvSpPr>
         <p:spPr>
           <a:xfrm>
-            <a:off x="831850" y="3059642"/>
-            <a:ext cx="10515600" cy="1000125"/>
+            <a:off x="998220" y="3059642"/>
+            <a:ext cx="12618720" cy="1000125"/>
           </a:xfrm>
         </p:spPr>
         <p:txBody>
@@ -1004,7 +1009,7 @@
           <a:p>
             <a:fld id="{764D14E5-F1A5-304C-AFC6-9FE4F2C8391C}" type="datetimeFigureOut">
               <a:rPr lang="en-US" smtClean="0"/>
-              <a:t>12/22/23</a:t>
+              <a:t>12/28/23</a:t>
             </a:fld>
             <a:endParaRPr lang="en-US"/>
           </a:p>
@@ -1055,7 +1060,7 @@
     </p:spTree>
     <p:extLst>
       <p:ext uri="{BB962C8B-B14F-4D97-AF65-F5344CB8AC3E}">
-        <p14:creationId xmlns:p14="http://schemas.microsoft.com/office/powerpoint/2010/main" val="1328761301"/>
+        <p14:creationId xmlns:p14="http://schemas.microsoft.com/office/powerpoint/2010/main" val="3573499628"/>
       </p:ext>
     </p:extLst>
   </p:cSld>
@@ -1117,8 +1122,8 @@
         </p:nvSpPr>
         <p:spPr>
           <a:xfrm>
-            <a:off x="838200" y="1217083"/>
-            <a:ext cx="5181600" cy="2900892"/>
+            <a:off x="1005840" y="1217083"/>
+            <a:ext cx="6217920" cy="2900892"/>
           </a:xfrm>
         </p:spPr>
         <p:txBody>
@@ -1174,8 +1179,8 @@
         </p:nvSpPr>
         <p:spPr>
           <a:xfrm>
-            <a:off x="6172200" y="1217083"/>
-            <a:ext cx="5181600" cy="2900892"/>
+            <a:off x="7406640" y="1217083"/>
+            <a:ext cx="6217920" cy="2900892"/>
           </a:xfrm>
         </p:spPr>
         <p:txBody>
@@ -1236,7 +1241,7 @@
           <a:p>
             <a:fld id="{764D14E5-F1A5-304C-AFC6-9FE4F2C8391C}" type="datetimeFigureOut">
               <a:rPr lang="en-US" smtClean="0"/>
-              <a:t>12/22/23</a:t>
+              <a:t>12/28/23</a:t>
             </a:fld>
             <a:endParaRPr lang="en-US"/>
           </a:p>
@@ -1287,7 +1292,7 @@
     </p:spTree>
     <p:extLst>
       <p:ext uri="{BB962C8B-B14F-4D97-AF65-F5344CB8AC3E}">
-        <p14:creationId xmlns:p14="http://schemas.microsoft.com/office/powerpoint/2010/main" val="3368172778"/>
+        <p14:creationId xmlns:p14="http://schemas.microsoft.com/office/powerpoint/2010/main" val="220849842"/>
       </p:ext>
     </p:extLst>
   </p:cSld>
@@ -1326,8 +1331,8 @@
         </p:nvSpPr>
         <p:spPr>
           <a:xfrm>
-            <a:off x="839788" y="243417"/>
-            <a:ext cx="10515600" cy="883709"/>
+            <a:off x="1007746" y="243417"/>
+            <a:ext cx="12618720" cy="883709"/>
           </a:xfrm>
         </p:spPr>
         <p:txBody>
@@ -1354,8 +1359,8 @@
         </p:nvSpPr>
         <p:spPr>
           <a:xfrm>
-            <a:off x="839789" y="1120775"/>
-            <a:ext cx="5157787" cy="549275"/>
+            <a:off x="1007746" y="1120775"/>
+            <a:ext cx="6189344" cy="549275"/>
           </a:xfrm>
         </p:spPr>
         <p:txBody>
@@ -1419,8 +1424,8 @@
         </p:nvSpPr>
         <p:spPr>
           <a:xfrm>
-            <a:off x="839789" y="1670050"/>
-            <a:ext cx="5157787" cy="2456392"/>
+            <a:off x="1007746" y="1670050"/>
+            <a:ext cx="6189344" cy="2456392"/>
           </a:xfrm>
         </p:spPr>
         <p:txBody>
@@ -1476,8 +1481,8 @@
         </p:nvSpPr>
         <p:spPr>
           <a:xfrm>
-            <a:off x="6172200" y="1120775"/>
-            <a:ext cx="5183188" cy="549275"/>
+            <a:off x="7406640" y="1120775"/>
+            <a:ext cx="6219826" cy="549275"/>
           </a:xfrm>
         </p:spPr>
         <p:txBody>
@@ -1541,8 +1546,8 @@
         </p:nvSpPr>
         <p:spPr>
           <a:xfrm>
-            <a:off x="6172200" y="1670050"/>
-            <a:ext cx="5183188" cy="2456392"/>
+            <a:off x="7406640" y="1670050"/>
+            <a:ext cx="6219826" cy="2456392"/>
           </a:xfrm>
         </p:spPr>
         <p:txBody>
@@ -1603,7 +1608,7 @@
           <a:p>
             <a:fld id="{764D14E5-F1A5-304C-AFC6-9FE4F2C8391C}" type="datetimeFigureOut">
               <a:rPr lang="en-US" smtClean="0"/>
-              <a:t>12/22/23</a:t>
+              <a:t>12/28/23</a:t>
             </a:fld>
             <a:endParaRPr lang="en-US"/>
           </a:p>
@@ -1654,7 +1659,7 @@
     </p:spTree>
     <p:extLst>
       <p:ext uri="{BB962C8B-B14F-4D97-AF65-F5344CB8AC3E}">
-        <p14:creationId xmlns:p14="http://schemas.microsoft.com/office/powerpoint/2010/main" val="1570615915"/>
+        <p14:creationId xmlns:p14="http://schemas.microsoft.com/office/powerpoint/2010/main" val="2741792825"/>
       </p:ext>
     </p:extLst>
   </p:cSld>
@@ -1721,7 +1726,7 @@
           <a:p>
             <a:fld id="{764D14E5-F1A5-304C-AFC6-9FE4F2C8391C}" type="datetimeFigureOut">
               <a:rPr lang="en-US" smtClean="0"/>
-              <a:t>12/22/23</a:t>
+              <a:t>12/28/23</a:t>
             </a:fld>
             <a:endParaRPr lang="en-US"/>
           </a:p>
@@ -1772,7 +1777,7 @@
     </p:spTree>
     <p:extLst>
       <p:ext uri="{BB962C8B-B14F-4D97-AF65-F5344CB8AC3E}">
-        <p14:creationId xmlns:p14="http://schemas.microsoft.com/office/powerpoint/2010/main" val="1512094745"/>
+        <p14:creationId xmlns:p14="http://schemas.microsoft.com/office/powerpoint/2010/main" val="304329552"/>
       </p:ext>
     </p:extLst>
   </p:cSld>
@@ -1816,7 +1821,7 @@
           <a:p>
             <a:fld id="{764D14E5-F1A5-304C-AFC6-9FE4F2C8391C}" type="datetimeFigureOut">
               <a:rPr lang="en-US" smtClean="0"/>
-              <a:t>12/22/23</a:t>
+              <a:t>12/28/23</a:t>
             </a:fld>
             <a:endParaRPr lang="en-US"/>
           </a:p>
@@ -1867,7 +1872,7 @@
     </p:spTree>
     <p:extLst>
       <p:ext uri="{BB962C8B-B14F-4D97-AF65-F5344CB8AC3E}">
-        <p14:creationId xmlns:p14="http://schemas.microsoft.com/office/powerpoint/2010/main" val="4205572913"/>
+        <p14:creationId xmlns:p14="http://schemas.microsoft.com/office/powerpoint/2010/main" val="3758684937"/>
       </p:ext>
     </p:extLst>
   </p:cSld>
@@ -1906,8 +1911,8 @@
         </p:nvSpPr>
         <p:spPr>
           <a:xfrm>
-            <a:off x="839789" y="304800"/>
-            <a:ext cx="3932237" cy="1066800"/>
+            <a:off x="1007746" y="304800"/>
+            <a:ext cx="4718684" cy="1066800"/>
           </a:xfrm>
         </p:spPr>
         <p:txBody>
@@ -1938,8 +1943,8 @@
         </p:nvSpPr>
         <p:spPr>
           <a:xfrm>
-            <a:off x="5183188" y="658284"/>
-            <a:ext cx="6172200" cy="3249083"/>
+            <a:off x="6219826" y="658284"/>
+            <a:ext cx="7406640" cy="3249083"/>
           </a:xfrm>
         </p:spPr>
         <p:txBody>
@@ -2023,8 +2028,8 @@
         </p:nvSpPr>
         <p:spPr>
           <a:xfrm>
-            <a:off x="839789" y="1371600"/>
-            <a:ext cx="3932237" cy="2541059"/>
+            <a:off x="1007746" y="1371600"/>
+            <a:ext cx="4718684" cy="2541059"/>
           </a:xfrm>
         </p:spPr>
         <p:txBody>
@@ -2093,7 +2098,7 @@
           <a:p>
             <a:fld id="{764D14E5-F1A5-304C-AFC6-9FE4F2C8391C}" type="datetimeFigureOut">
               <a:rPr lang="en-US" smtClean="0"/>
-              <a:t>12/22/23</a:t>
+              <a:t>12/28/23</a:t>
             </a:fld>
             <a:endParaRPr lang="en-US"/>
           </a:p>
@@ -2144,7 +2149,7 @@
     </p:spTree>
     <p:extLst>
       <p:ext uri="{BB962C8B-B14F-4D97-AF65-F5344CB8AC3E}">
-        <p14:creationId xmlns:p14="http://schemas.microsoft.com/office/powerpoint/2010/main" val="4150477393"/>
+        <p14:creationId xmlns:p14="http://schemas.microsoft.com/office/powerpoint/2010/main" val="3398740950"/>
       </p:ext>
     </p:extLst>
   </p:cSld>
@@ -2183,8 +2188,8 @@
         </p:nvSpPr>
         <p:spPr>
           <a:xfrm>
-            <a:off x="839789" y="304800"/>
-            <a:ext cx="3932237" cy="1066800"/>
+            <a:off x="1007746" y="304800"/>
+            <a:ext cx="4718684" cy="1066800"/>
           </a:xfrm>
         </p:spPr>
         <p:txBody>
@@ -2215,8 +2220,8 @@
         </p:nvSpPr>
         <p:spPr>
           <a:xfrm>
-            <a:off x="5183188" y="658284"/>
-            <a:ext cx="6172200" cy="3249083"/>
+            <a:off x="6219826" y="658284"/>
+            <a:ext cx="7406640" cy="3249083"/>
           </a:xfrm>
         </p:spPr>
         <p:txBody>
@@ -2280,8 +2285,8 @@
         </p:nvSpPr>
         <p:spPr>
           <a:xfrm>
-            <a:off x="839789" y="1371600"/>
-            <a:ext cx="3932237" cy="2541059"/>
+            <a:off x="1007746" y="1371600"/>
+            <a:ext cx="4718684" cy="2541059"/>
           </a:xfrm>
         </p:spPr>
         <p:txBody>
@@ -2350,7 +2355,7 @@
           <a:p>
             <a:fld id="{764D14E5-F1A5-304C-AFC6-9FE4F2C8391C}" type="datetimeFigureOut">
               <a:rPr lang="en-US" smtClean="0"/>
-              <a:t>12/22/23</a:t>
+              <a:t>12/28/23</a:t>
             </a:fld>
             <a:endParaRPr lang="en-US"/>
           </a:p>
@@ -2401,7 +2406,7 @@
     </p:spTree>
     <p:extLst>
       <p:ext uri="{BB962C8B-B14F-4D97-AF65-F5344CB8AC3E}">
-        <p14:creationId xmlns:p14="http://schemas.microsoft.com/office/powerpoint/2010/main" val="1369855243"/>
+        <p14:creationId xmlns:p14="http://schemas.microsoft.com/office/powerpoint/2010/main" val="1684960952"/>
       </p:ext>
     </p:extLst>
   </p:cSld>
@@ -2445,8 +2450,8 @@
         </p:nvSpPr>
         <p:spPr>
           <a:xfrm>
-            <a:off x="838200" y="243417"/>
-            <a:ext cx="10515600" cy="883709"/>
+            <a:off x="1005840" y="243417"/>
+            <a:ext cx="12618720" cy="883709"/>
           </a:xfrm>
           <a:prstGeom prst="rect">
             <a:avLst/>
@@ -2478,8 +2483,8 @@
         </p:nvSpPr>
         <p:spPr>
           <a:xfrm>
-            <a:off x="838200" y="1217083"/>
-            <a:ext cx="10515600" cy="2900892"/>
+            <a:off x="1005840" y="1217083"/>
+            <a:ext cx="12618720" cy="2900892"/>
           </a:xfrm>
           <a:prstGeom prst="rect">
             <a:avLst/>
@@ -2540,8 +2545,8 @@
         </p:nvSpPr>
         <p:spPr>
           <a:xfrm>
-            <a:off x="838200" y="4237567"/>
-            <a:ext cx="2743200" cy="243417"/>
+            <a:off x="1005840" y="4237567"/>
+            <a:ext cx="3291840" cy="243417"/>
           </a:xfrm>
           <a:prstGeom prst="rect">
             <a:avLst/>
@@ -2563,7 +2568,7 @@
           <a:p>
             <a:fld id="{764D14E5-F1A5-304C-AFC6-9FE4F2C8391C}" type="datetimeFigureOut">
               <a:rPr lang="en-US" smtClean="0"/>
-              <a:t>12/22/23</a:t>
+              <a:t>12/28/23</a:t>
             </a:fld>
             <a:endParaRPr lang="en-US"/>
           </a:p>
@@ -2581,8 +2586,8 @@
         </p:nvSpPr>
         <p:spPr>
           <a:xfrm>
-            <a:off x="4038600" y="4237567"/>
-            <a:ext cx="4114800" cy="243417"/>
+            <a:off x="4846320" y="4237567"/>
+            <a:ext cx="4937760" cy="243417"/>
           </a:xfrm>
           <a:prstGeom prst="rect">
             <a:avLst/>
@@ -2618,8 +2623,8 @@
         </p:nvSpPr>
         <p:spPr>
           <a:xfrm>
-            <a:off x="8610600" y="4237567"/>
-            <a:ext cx="2743200" cy="243417"/>
+            <a:off x="10332720" y="4237567"/>
+            <a:ext cx="3291840" cy="243417"/>
           </a:xfrm>
           <a:prstGeom prst="rect">
             <a:avLst/>
@@ -2650,23 +2655,23 @@
     </p:spTree>
     <p:extLst>
       <p:ext uri="{BB962C8B-B14F-4D97-AF65-F5344CB8AC3E}">
-        <p14:creationId xmlns:p14="http://schemas.microsoft.com/office/powerpoint/2010/main" val="311279229"/>
+        <p14:creationId xmlns:p14="http://schemas.microsoft.com/office/powerpoint/2010/main" val="2875293979"/>
       </p:ext>
     </p:extLst>
   </p:cSld>
   <p:clrMap bg1="lt1" tx1="dk1" bg2="lt2" tx2="dk2" accent1="accent1" accent2="accent2" accent3="accent3" accent4="accent4" accent5="accent5" accent6="accent6" hlink="hlink" folHlink="folHlink"/>
   <p:sldLayoutIdLst>
-    <p:sldLayoutId id="2147483661" r:id="rId1"/>
-    <p:sldLayoutId id="2147483662" r:id="rId2"/>
-    <p:sldLayoutId id="2147483663" r:id="rId3"/>
-    <p:sldLayoutId id="2147483664" r:id="rId4"/>
-    <p:sldLayoutId id="2147483665" r:id="rId5"/>
-    <p:sldLayoutId id="2147483666" r:id="rId6"/>
-    <p:sldLayoutId id="2147483667" r:id="rId7"/>
-    <p:sldLayoutId id="2147483668" r:id="rId8"/>
-    <p:sldLayoutId id="2147483669" r:id="rId9"/>
-    <p:sldLayoutId id="2147483670" r:id="rId10"/>
-    <p:sldLayoutId id="2147483671" r:id="rId11"/>
+    <p:sldLayoutId id="2147483673" r:id="rId1"/>
+    <p:sldLayoutId id="2147483674" r:id="rId2"/>
+    <p:sldLayoutId id="2147483675" r:id="rId3"/>
+    <p:sldLayoutId id="2147483676" r:id="rId4"/>
+    <p:sldLayoutId id="2147483677" r:id="rId5"/>
+    <p:sldLayoutId id="2147483678" r:id="rId6"/>
+    <p:sldLayoutId id="2147483679" r:id="rId7"/>
+    <p:sldLayoutId id="2147483680" r:id="rId8"/>
+    <p:sldLayoutId id="2147483681" r:id="rId9"/>
+    <p:sldLayoutId id="2147483682" r:id="rId10"/>
+    <p:sldLayoutId id="2147483683" r:id="rId11"/>
   </p:sldLayoutIdLst>
   <p:txStyles>
     <p:titleStyle>
@@ -2970,10 +2975,10 @@
       </p:grpSpPr>
       <p:grpSp>
         <p:nvGrpSpPr>
-          <p:cNvPr id="21" name="Group 20">
+          <p:cNvPr id="6" name="Group 5">
             <a:extLst>
               <a:ext uri="{FF2B5EF4-FFF2-40B4-BE49-F238E27FC236}">
-                <a16:creationId xmlns:a16="http://schemas.microsoft.com/office/drawing/2014/main" id="{F07CDCD5-372D-83EE-DE0F-85B3F5B39DFF}"/>
+                <a16:creationId xmlns:a16="http://schemas.microsoft.com/office/drawing/2014/main" id="{58B1FA5B-335F-9427-C6EB-1036A08DB6D3}"/>
               </a:ext>
             </a:extLst>
           </p:cNvPr>
@@ -2982,18 +2987,18 @@
         </p:nvGrpSpPr>
         <p:grpSpPr>
           <a:xfrm>
-            <a:off x="203200" y="622300"/>
-            <a:ext cx="11506200" cy="3583200"/>
-            <a:chOff x="114300" y="584200"/>
-            <a:chExt cx="11506200" cy="3583200"/>
+            <a:off x="215655" y="61746"/>
+            <a:ext cx="14199090" cy="4510255"/>
+            <a:chOff x="441123" y="61746"/>
+            <a:chExt cx="14199090" cy="4510255"/>
           </a:xfrm>
         </p:grpSpPr>
         <p:pic>
           <p:nvPicPr>
-            <p:cNvPr id="18" name="Picture 17" descr="A graph of a group of groups&#10;&#10;Description automatically generated with medium confidence">
+            <p:cNvPr id="3" name="Picture 2" descr="A graph of different types of groups&#10;&#10;Description automatically generated with medium confidence">
               <a:extLst>
                 <a:ext uri="{FF2B5EF4-FFF2-40B4-BE49-F238E27FC236}">
-                  <a16:creationId xmlns:a16="http://schemas.microsoft.com/office/drawing/2014/main" id="{2270B8C8-A6E2-6A23-9A37-68CA6D18D396}"/>
+                  <a16:creationId xmlns:a16="http://schemas.microsoft.com/office/drawing/2014/main" id="{FA19BF15-C847-4D7D-45A0-F497BF3D5A69}"/>
                 </a:ext>
               </a:extLst>
             </p:cNvPr>
@@ -3004,13 +3009,13 @@
           </p:nvPicPr>
           <p:blipFill rotWithShape="1">
             <a:blip r:embed="rId2"/>
-            <a:srcRect r="8152"/>
+            <a:srcRect r="8500"/>
             <a:stretch/>
           </p:blipFill>
           <p:spPr>
             <a:xfrm>
-              <a:off x="5038300" y="584200"/>
-              <a:ext cx="6582200" cy="3583200"/>
+              <a:off x="6386487" y="61746"/>
+              <a:ext cx="8253726" cy="4510255"/>
             </a:xfrm>
             <a:prstGeom prst="rect">
               <a:avLst/>
@@ -3019,10 +3024,10 @@
         </p:pic>
         <p:pic>
           <p:nvPicPr>
-            <p:cNvPr id="20" name="Picture 19" descr="A graph of different groups of groups&#10;&#10;Description automatically generated with medium confidence">
+            <p:cNvPr id="5" name="Picture 4" descr="A graph with different colored lines&#10;&#10;Description automatically generated with medium confidence">
               <a:extLst>
                 <a:ext uri="{FF2B5EF4-FFF2-40B4-BE49-F238E27FC236}">
-                  <a16:creationId xmlns:a16="http://schemas.microsoft.com/office/drawing/2014/main" id="{C59B50DD-385B-A77F-7FCA-F61511165F58}"/>
+                  <a16:creationId xmlns:a16="http://schemas.microsoft.com/office/drawing/2014/main" id="{951400EA-984F-7549-8994-4AEA5F846B85}"/>
                 </a:ext>
               </a:extLst>
             </p:cNvPr>
@@ -3039,8 +3044,8 @@
           </p:blipFill>
           <p:spPr>
             <a:xfrm>
-              <a:off x="381794" y="584200"/>
-              <a:ext cx="4777600" cy="3583200"/>
+              <a:off x="441123" y="61746"/>
+              <a:ext cx="6013671" cy="4510254"/>
             </a:xfrm>
             <a:prstGeom prst="rect">
               <a:avLst/>
@@ -3061,10 +3066,10 @@
           </p:nvGrpSpPr>
           <p:grpSpPr>
             <a:xfrm>
-              <a:off x="114300" y="1066802"/>
-              <a:ext cx="5213693" cy="461665"/>
-              <a:chOff x="85462" y="1155702"/>
-              <a:chExt cx="5213693" cy="461665"/>
+              <a:off x="1005447" y="1824334"/>
+              <a:ext cx="6185144" cy="461666"/>
+              <a:chOff x="-331492" y="1875133"/>
+              <a:chExt cx="6185144" cy="461666"/>
             </a:xfrm>
           </p:grpSpPr>
           <p:sp>
@@ -3081,7 +3086,7 @@
             </p:nvSpPr>
             <p:spPr>
               <a:xfrm>
-                <a:off x="85462" y="1155702"/>
+                <a:off x="-331492" y="1875134"/>
                 <a:ext cx="362600" cy="461665"/>
               </a:xfrm>
               <a:prstGeom prst="rect">
@@ -3117,7 +3122,7 @@
             </p:nvSpPr>
             <p:spPr>
               <a:xfrm>
-                <a:off x="4936555" y="1155702"/>
+                <a:off x="5491052" y="1875133"/>
                 <a:ext cx="362600" cy="461665"/>
               </a:xfrm>
               <a:prstGeom prst="rect">

</xml_diff>